<commit_message>
Version noche antes funcional menos Empleados
</commit_message>
<xml_diff>
--- a/ManualUsuario.pptx
+++ b/ManualUsuario.pptx
@@ -278,7 +278,7 @@
           <a:p>
             <a:fld id="{39E7580C-3BDD-4C58-BA52-5F50CD20D3B5}" type="datetimeFigureOut">
               <a:rPr lang="es-HN" smtClean="0"/>
-              <a:t>29/3/2025</a:t>
+              <a:t>4/4/2025</a:t>
             </a:fld>
             <a:endParaRPr lang="es-HN"/>
           </a:p>
@@ -478,7 +478,7 @@
           <a:p>
             <a:fld id="{39E7580C-3BDD-4C58-BA52-5F50CD20D3B5}" type="datetimeFigureOut">
               <a:rPr lang="es-HN" smtClean="0"/>
-              <a:t>29/3/2025</a:t>
+              <a:t>4/4/2025</a:t>
             </a:fld>
             <a:endParaRPr lang="es-HN"/>
           </a:p>
@@ -688,7 +688,7 @@
           <a:p>
             <a:fld id="{39E7580C-3BDD-4C58-BA52-5F50CD20D3B5}" type="datetimeFigureOut">
               <a:rPr lang="es-HN" smtClean="0"/>
-              <a:t>29/3/2025</a:t>
+              <a:t>4/4/2025</a:t>
             </a:fld>
             <a:endParaRPr lang="es-HN"/>
           </a:p>
@@ -888,7 +888,7 @@
           <a:p>
             <a:fld id="{39E7580C-3BDD-4C58-BA52-5F50CD20D3B5}" type="datetimeFigureOut">
               <a:rPr lang="es-HN" smtClean="0"/>
-              <a:t>29/3/2025</a:t>
+              <a:t>4/4/2025</a:t>
             </a:fld>
             <a:endParaRPr lang="es-HN"/>
           </a:p>
@@ -1164,7 +1164,7 @@
           <a:p>
             <a:fld id="{39E7580C-3BDD-4C58-BA52-5F50CD20D3B5}" type="datetimeFigureOut">
               <a:rPr lang="es-HN" smtClean="0"/>
-              <a:t>29/3/2025</a:t>
+              <a:t>4/4/2025</a:t>
             </a:fld>
             <a:endParaRPr lang="es-HN"/>
           </a:p>
@@ -1432,7 +1432,7 @@
           <a:p>
             <a:fld id="{39E7580C-3BDD-4C58-BA52-5F50CD20D3B5}" type="datetimeFigureOut">
               <a:rPr lang="es-HN" smtClean="0"/>
-              <a:t>29/3/2025</a:t>
+              <a:t>4/4/2025</a:t>
             </a:fld>
             <a:endParaRPr lang="es-HN"/>
           </a:p>
@@ -1847,7 +1847,7 @@
           <a:p>
             <a:fld id="{39E7580C-3BDD-4C58-BA52-5F50CD20D3B5}" type="datetimeFigureOut">
               <a:rPr lang="es-HN" smtClean="0"/>
-              <a:t>29/3/2025</a:t>
+              <a:t>4/4/2025</a:t>
             </a:fld>
             <a:endParaRPr lang="es-HN"/>
           </a:p>
@@ -1989,7 +1989,7 @@
           <a:p>
             <a:fld id="{39E7580C-3BDD-4C58-BA52-5F50CD20D3B5}" type="datetimeFigureOut">
               <a:rPr lang="es-HN" smtClean="0"/>
-              <a:t>29/3/2025</a:t>
+              <a:t>4/4/2025</a:t>
             </a:fld>
             <a:endParaRPr lang="es-HN"/>
           </a:p>
@@ -2102,7 +2102,7 @@
           <a:p>
             <a:fld id="{39E7580C-3BDD-4C58-BA52-5F50CD20D3B5}" type="datetimeFigureOut">
               <a:rPr lang="es-HN" smtClean="0"/>
-              <a:t>29/3/2025</a:t>
+              <a:t>4/4/2025</a:t>
             </a:fld>
             <a:endParaRPr lang="es-HN"/>
           </a:p>
@@ -2415,7 +2415,7 @@
           <a:p>
             <a:fld id="{39E7580C-3BDD-4C58-BA52-5F50CD20D3B5}" type="datetimeFigureOut">
               <a:rPr lang="es-HN" smtClean="0"/>
-              <a:t>29/3/2025</a:t>
+              <a:t>4/4/2025</a:t>
             </a:fld>
             <a:endParaRPr lang="es-HN"/>
           </a:p>
@@ -2704,7 +2704,7 @@
           <a:p>
             <a:fld id="{39E7580C-3BDD-4C58-BA52-5F50CD20D3B5}" type="datetimeFigureOut">
               <a:rPr lang="es-HN" smtClean="0"/>
-              <a:t>29/3/2025</a:t>
+              <a:t>4/4/2025</a:t>
             </a:fld>
             <a:endParaRPr lang="es-HN"/>
           </a:p>
@@ -2947,7 +2947,7 @@
           <a:p>
             <a:fld id="{39E7580C-3BDD-4C58-BA52-5F50CD20D3B5}" type="datetimeFigureOut">
               <a:rPr lang="es-HN" smtClean="0"/>
-              <a:t>29/3/2025</a:t>
+              <a:t>4/4/2025</a:t>
             </a:fld>
             <a:endParaRPr lang="es-HN"/>
           </a:p>

</xml_diff>